<commit_message>
revise AOSP app investigation
</commit_message>
<xml_diff>
--- a/Android10/5_1_1_AOSP_App_Investigations_Messaging.pptx
+++ b/Android10/5_1_1_AOSP_App_Investigations_Messaging.pptx
@@ -29,10 +29,10 @@
     <p:sldId id="429" r:id="rId20"/>
     <p:sldId id="459" r:id="rId21"/>
     <p:sldId id="384" r:id="rId22"/>
-    <p:sldId id="436" r:id="rId23"/>
-    <p:sldId id="458" r:id="rId24"/>
-    <p:sldId id="386" r:id="rId25"/>
-    <p:sldId id="413" r:id="rId26"/>
+    <p:sldId id="460" r:id="rId23"/>
+    <p:sldId id="436" r:id="rId24"/>
+    <p:sldId id="458" r:id="rId25"/>
+    <p:sldId id="386" r:id="rId26"/>
   </p:sldIdLst>
   <p:sldSz cx="12192000" cy="6858000"/>
   <p:notesSz cx="6858000" cy="9144000"/>
@@ -154,7 +154,7 @@
 <file path=ppt/revisionInfo.xml><?xml version="1.0" encoding="utf-8"?>
 <p1510:revInfo xmlns:a="http://schemas.openxmlformats.org/drawingml/2006/main" xmlns:r="http://schemas.openxmlformats.org/officeDocument/2006/relationships" xmlns:p1510="http://schemas.microsoft.com/office/powerpoint/2015/10/main">
   <p1510:revLst>
-    <p1510:client id="{A607ACB5-F40C-412A-A21E-8D57A08453C8}" v="42" dt="2024-12-30T21:11:23.227"/>
+    <p1510:client id="{A607ACB5-F40C-412A-A21E-8D57A08453C8}" v="44" dt="2025-04-01T01:53:12.160"/>
   </p1510:revLst>
 </p1510:revInfo>
 </file>
@@ -4121,22 +4121,22 @@
   <pc:docChgLst>
     <pc:chgData name="Weifeng Xu" userId="e7aed605-a3dd-4d5a-a692-a87037af107b" providerId="ADAL" clId="{A607ACB5-F40C-412A-A21E-8D57A08453C8}"/>
     <pc:docChg chg="undo redo custSel addSld delSld modSld sldOrd">
-      <pc:chgData name="Weifeng Xu" userId="e7aed605-a3dd-4d5a-a692-a87037af107b" providerId="ADAL" clId="{A607ACB5-F40C-412A-A21E-8D57A08453C8}" dt="2025-01-01T14:54:15.466" v="2884" actId="20577"/>
+      <pc:chgData name="Weifeng Xu" userId="e7aed605-a3dd-4d5a-a692-a87037af107b" providerId="ADAL" clId="{A607ACB5-F40C-412A-A21E-8D57A08453C8}" dt="2025-04-03T01:00:25.132" v="3153" actId="6549"/>
       <pc:docMkLst>
         <pc:docMk/>
       </pc:docMkLst>
       <pc:sldChg chg="modSp mod">
-        <pc:chgData name="Weifeng Xu" userId="e7aed605-a3dd-4d5a-a692-a87037af107b" providerId="ADAL" clId="{A607ACB5-F40C-412A-A21E-8D57A08453C8}" dt="2025-01-01T14:54:15.466" v="2884" actId="20577"/>
+        <pc:chgData name="Weifeng Xu" userId="e7aed605-a3dd-4d5a-a692-a87037af107b" providerId="ADAL" clId="{A607ACB5-F40C-412A-A21E-8D57A08453C8}" dt="2025-04-03T01:00:25.132" v="3153" actId="6549"/>
         <pc:sldMkLst>
           <pc:docMk/>
           <pc:sldMk cId="1323245308" sldId="256"/>
         </pc:sldMkLst>
         <pc:spChg chg="mod">
-          <ac:chgData name="Weifeng Xu" userId="e7aed605-a3dd-4d5a-a692-a87037af107b" providerId="ADAL" clId="{A607ACB5-F40C-412A-A21E-8D57A08453C8}" dt="2025-01-01T14:54:15.466" v="2884" actId="20577"/>
+          <ac:chgData name="Weifeng Xu" userId="e7aed605-a3dd-4d5a-a692-a87037af107b" providerId="ADAL" clId="{A607ACB5-F40C-412A-A21E-8D57A08453C8}" dt="2025-04-03T01:00:25.132" v="3153" actId="6549"/>
           <ac:spMkLst>
             <pc:docMk/>
             <pc:sldMk cId="1323245308" sldId="256"/>
-            <ac:spMk id="3" creationId="{58CD3106-2EE0-40F4-8C0B-042135FF9FB4}"/>
+            <ac:spMk id="2" creationId="{B476BAF9-88AC-4600-B511-347782B9C875}"/>
           </ac:spMkLst>
         </pc:spChg>
       </pc:sldChg>
@@ -4146,22 +4146,6 @@
           <pc:docMk/>
           <pc:sldMk cId="1408481161" sldId="346"/>
         </pc:sldMkLst>
-        <pc:picChg chg="mod">
-          <ac:chgData name="Weifeng Xu" userId="e7aed605-a3dd-4d5a-a692-a87037af107b" providerId="ADAL" clId="{A607ACB5-F40C-412A-A21E-8D57A08453C8}" dt="2024-12-30T16:36:28.079" v="2641" actId="14100"/>
-          <ac:picMkLst>
-            <pc:docMk/>
-            <pc:sldMk cId="1408481161" sldId="346"/>
-            <ac:picMk id="11" creationId="{D6DF6FE0-41AC-4C44-932F-84EBF02AED2B}"/>
-          </ac:picMkLst>
-        </pc:picChg>
-        <pc:cxnChg chg="mod">
-          <ac:chgData name="Weifeng Xu" userId="e7aed605-a3dd-4d5a-a692-a87037af107b" providerId="ADAL" clId="{A607ACB5-F40C-412A-A21E-8D57A08453C8}" dt="2024-12-30T16:36:28.079" v="2641" actId="14100"/>
-          <ac:cxnSpMkLst>
-            <pc:docMk/>
-            <pc:sldMk cId="1408481161" sldId="346"/>
-            <ac:cxnSpMk id="15" creationId="{1A1927F3-7639-4E0E-B3D2-CFB18A4AF12A}"/>
-          </ac:cxnSpMkLst>
-        </pc:cxnChg>
       </pc:sldChg>
       <pc:sldChg chg="modSp mod">
         <pc:chgData name="Weifeng Xu" userId="e7aed605-a3dd-4d5a-a692-a87037af107b" providerId="ADAL" clId="{A607ACB5-F40C-412A-A21E-8D57A08453C8}" dt="2024-12-30T16:39:53.523" v="2642" actId="1076"/>
@@ -4169,14 +4153,6 @@
           <pc:docMk/>
           <pc:sldMk cId="3077270470" sldId="375"/>
         </pc:sldMkLst>
-        <pc:cxnChg chg="mod">
-          <ac:chgData name="Weifeng Xu" userId="e7aed605-a3dd-4d5a-a692-a87037af107b" providerId="ADAL" clId="{A607ACB5-F40C-412A-A21E-8D57A08453C8}" dt="2024-12-30T16:39:53.523" v="2642" actId="1076"/>
-          <ac:cxnSpMkLst>
-            <pc:docMk/>
-            <pc:sldMk cId="3077270470" sldId="375"/>
-            <ac:cxnSpMk id="16" creationId="{2CB0E1ED-D407-4087-8F30-54794BB23D8B}"/>
-          </ac:cxnSpMkLst>
-        </pc:cxnChg>
       </pc:sldChg>
       <pc:sldChg chg="addSp delSp modSp mod modClrScheme chgLayout">
         <pc:chgData name="Weifeng Xu" userId="e7aed605-a3dd-4d5a-a692-a87037af107b" providerId="ADAL" clId="{A607ACB5-F40C-412A-A21E-8D57A08453C8}" dt="2021-07-27T19:41:57.370" v="477" actId="20577"/>
@@ -4193,13 +4169,13 @@
         </pc:sldMkLst>
       </pc:sldChg>
       <pc:sldChg chg="addSp delSp modSp mod modClrScheme chgLayout">
-        <pc:chgData name="Weifeng Xu" userId="e7aed605-a3dd-4d5a-a692-a87037af107b" providerId="ADAL" clId="{A607ACB5-F40C-412A-A21E-8D57A08453C8}" dt="2024-12-30T21:11:46.116" v="2795" actId="478"/>
+        <pc:chgData name="Weifeng Xu" userId="e7aed605-a3dd-4d5a-a692-a87037af107b" providerId="ADAL" clId="{A607ACB5-F40C-412A-A21E-8D57A08453C8}" dt="2025-04-01T02:32:53.687" v="3056" actId="6549"/>
         <pc:sldMkLst>
           <pc:docMk/>
           <pc:sldMk cId="4148899360" sldId="379"/>
         </pc:sldMkLst>
         <pc:spChg chg="add mod">
-          <ac:chgData name="Weifeng Xu" userId="e7aed605-a3dd-4d5a-a692-a87037af107b" providerId="ADAL" clId="{A607ACB5-F40C-412A-A21E-8D57A08453C8}" dt="2024-12-30T21:11:28.617" v="2792" actId="1037"/>
+          <ac:chgData name="Weifeng Xu" userId="e7aed605-a3dd-4d5a-a692-a87037af107b" providerId="ADAL" clId="{A607ACB5-F40C-412A-A21E-8D57A08453C8}" dt="2025-04-01T01:50:02.267" v="2941" actId="1035"/>
           <ac:spMkLst>
             <pc:docMk/>
             <pc:sldMk cId="4148899360" sldId="379"/>
@@ -4207,15 +4183,55 @@
           </ac:spMkLst>
         </pc:spChg>
         <pc:spChg chg="mod">
-          <ac:chgData name="Weifeng Xu" userId="e7aed605-a3dd-4d5a-a692-a87037af107b" providerId="ADAL" clId="{A607ACB5-F40C-412A-A21E-8D57A08453C8}" dt="2024-12-30T21:10:35.780" v="2758" actId="20577"/>
+          <ac:chgData name="Weifeng Xu" userId="e7aed605-a3dd-4d5a-a692-a87037af107b" providerId="ADAL" clId="{A607ACB5-F40C-412A-A21E-8D57A08453C8}" dt="2025-04-01T01:50:02.267" v="2941" actId="1035"/>
+          <ac:spMkLst>
+            <pc:docMk/>
+            <pc:sldMk cId="4148899360" sldId="379"/>
+            <ac:spMk id="7" creationId="{F506C3D8-38FE-44CB-BA11-7F2808C917F7}"/>
+          </ac:spMkLst>
+        </pc:spChg>
+        <pc:spChg chg="mod">
+          <ac:chgData name="Weifeng Xu" userId="e7aed605-a3dd-4d5a-a692-a87037af107b" providerId="ADAL" clId="{A607ACB5-F40C-412A-A21E-8D57A08453C8}" dt="2025-04-01T02:32:53.687" v="3056" actId="6549"/>
           <ac:spMkLst>
             <pc:docMk/>
             <pc:sldMk cId="4148899360" sldId="379"/>
             <ac:spMk id="9" creationId="{679CCB7E-888F-414E-913B-55CECD9C2D4D}"/>
           </ac:spMkLst>
         </pc:spChg>
+        <pc:spChg chg="mod">
+          <ac:chgData name="Weifeng Xu" userId="e7aed605-a3dd-4d5a-a692-a87037af107b" providerId="ADAL" clId="{A607ACB5-F40C-412A-A21E-8D57A08453C8}" dt="2025-04-01T01:50:02.267" v="2941" actId="1035"/>
+          <ac:spMkLst>
+            <pc:docMk/>
+            <pc:sldMk cId="4148899360" sldId="379"/>
+            <ac:spMk id="20" creationId="{532BF592-AD69-4366-9237-AEF4158217EF}"/>
+          </ac:spMkLst>
+        </pc:spChg>
+        <pc:spChg chg="mod">
+          <ac:chgData name="Weifeng Xu" userId="e7aed605-a3dd-4d5a-a692-a87037af107b" providerId="ADAL" clId="{A607ACB5-F40C-412A-A21E-8D57A08453C8}" dt="2025-04-01T01:50:02.267" v="2941" actId="1035"/>
+          <ac:spMkLst>
+            <pc:docMk/>
+            <pc:sldMk cId="4148899360" sldId="379"/>
+            <ac:spMk id="21" creationId="{FDE34F1C-ABAD-4C8B-BC8E-68141DC3B381}"/>
+          </ac:spMkLst>
+        </pc:spChg>
+        <pc:picChg chg="mod">
+          <ac:chgData name="Weifeng Xu" userId="e7aed605-a3dd-4d5a-a692-a87037af107b" providerId="ADAL" clId="{A607ACB5-F40C-412A-A21E-8D57A08453C8}" dt="2025-04-01T01:50:02.267" v="2941" actId="1035"/>
+          <ac:picMkLst>
+            <pc:docMk/>
+            <pc:sldMk cId="4148899360" sldId="379"/>
+            <ac:picMk id="5" creationId="{232CDD55-5E33-4F9C-BCC6-B073648A14A1}"/>
+          </ac:picMkLst>
+        </pc:picChg>
+        <pc:picChg chg="mod">
+          <ac:chgData name="Weifeng Xu" userId="e7aed605-a3dd-4d5a-a692-a87037af107b" providerId="ADAL" clId="{A607ACB5-F40C-412A-A21E-8D57A08453C8}" dt="2025-04-01T01:50:02.267" v="2941" actId="1035"/>
+          <ac:picMkLst>
+            <pc:docMk/>
+            <pc:sldMk cId="4148899360" sldId="379"/>
+            <ac:picMk id="19" creationId="{35DB7AB5-D076-4186-8183-24D35A5FE4D8}"/>
+          </ac:picMkLst>
+        </pc:picChg>
         <pc:cxnChg chg="add mod">
-          <ac:chgData name="Weifeng Xu" userId="e7aed605-a3dd-4d5a-a692-a87037af107b" providerId="ADAL" clId="{A607ACB5-F40C-412A-A21E-8D57A08453C8}" dt="2024-12-30T21:11:33.521" v="2793" actId="14100"/>
+          <ac:chgData name="Weifeng Xu" userId="e7aed605-a3dd-4d5a-a692-a87037af107b" providerId="ADAL" clId="{A607ACB5-F40C-412A-A21E-8D57A08453C8}" dt="2025-04-01T01:18:30.251" v="2885" actId="14100"/>
           <ac:cxnSpMkLst>
             <pc:docMk/>
             <pc:sldMk cId="4148899360" sldId="379"/>
@@ -4223,7 +4239,15 @@
           </ac:cxnSpMkLst>
         </pc:cxnChg>
         <pc:cxnChg chg="mod">
-          <ac:chgData name="Weifeng Xu" userId="e7aed605-a3dd-4d5a-a692-a87037af107b" providerId="ADAL" clId="{A607ACB5-F40C-412A-A21E-8D57A08453C8}" dt="2024-12-30T21:08:05.297" v="2717" actId="14100"/>
+          <ac:chgData name="Weifeng Xu" userId="e7aed605-a3dd-4d5a-a692-a87037af107b" providerId="ADAL" clId="{A607ACB5-F40C-412A-A21E-8D57A08453C8}" dt="2025-04-01T01:50:02.267" v="2941" actId="1035"/>
+          <ac:cxnSpMkLst>
+            <pc:docMk/>
+            <pc:sldMk cId="4148899360" sldId="379"/>
+            <ac:cxnSpMk id="8" creationId="{63E3F617-7620-49BF-8A43-A84535A96944}"/>
+          </ac:cxnSpMkLst>
+        </pc:cxnChg>
+        <pc:cxnChg chg="mod">
+          <ac:chgData name="Weifeng Xu" userId="e7aed605-a3dd-4d5a-a692-a87037af107b" providerId="ADAL" clId="{A607ACB5-F40C-412A-A21E-8D57A08453C8}" dt="2025-04-01T01:50:02.267" v="2941" actId="1035"/>
           <ac:cxnSpMkLst>
             <pc:docMk/>
             <pc:sldMk cId="4148899360" sldId="379"/>
@@ -4237,14 +4261,6 @@
           <pc:docMk/>
           <pc:sldMk cId="3268356748" sldId="380"/>
         </pc:sldMkLst>
-        <pc:spChg chg="mod">
-          <ac:chgData name="Weifeng Xu" userId="e7aed605-a3dd-4d5a-a692-a87037af107b" providerId="ADAL" clId="{A607ACB5-F40C-412A-A21E-8D57A08453C8}" dt="2024-12-30T21:17:06.789" v="2871" actId="20577"/>
-          <ac:spMkLst>
-            <pc:docMk/>
-            <pc:sldMk cId="3268356748" sldId="380"/>
-            <ac:spMk id="3" creationId="{9245C43A-EBA4-49C9-9369-095A49DC2464}"/>
-          </ac:spMkLst>
-        </pc:spChg>
       </pc:sldChg>
       <pc:sldChg chg="addSp delSp modSp mod modClrScheme chgLayout">
         <pc:chgData name="Weifeng Xu" userId="e7aed605-a3dd-4d5a-a692-a87037af107b" providerId="ADAL" clId="{A607ACB5-F40C-412A-A21E-8D57A08453C8}" dt="2021-07-29T14:43:44.356" v="2456" actId="1076"/>
@@ -4266,54 +4282,22 @@
           <pc:docMk/>
           <pc:sldMk cId="4046926907" sldId="384"/>
         </pc:sldMkLst>
+      </pc:sldChg>
+      <pc:sldChg chg="del">
+        <pc:chgData name="Weifeng Xu" userId="e7aed605-a3dd-4d5a-a692-a87037af107b" providerId="ADAL" clId="{A607ACB5-F40C-412A-A21E-8D57A08453C8}" dt="2021-07-27T23:25:53.927" v="1167" actId="47"/>
+        <pc:sldMkLst>
+          <pc:docMk/>
+          <pc:sldMk cId="954730872" sldId="385"/>
+        </pc:sldMkLst>
+      </pc:sldChg>
+      <pc:sldChg chg="modSp add del mod">
+        <pc:chgData name="Weifeng Xu" userId="e7aed605-a3dd-4d5a-a692-a87037af107b" providerId="ADAL" clId="{A607ACB5-F40C-412A-A21E-8D57A08453C8}" dt="2025-04-01T02:42:13.408" v="3143" actId="20577"/>
+        <pc:sldMkLst>
+          <pc:docMk/>
+          <pc:sldMk cId="3188243652" sldId="386"/>
+        </pc:sldMkLst>
         <pc:spChg chg="mod">
-          <ac:chgData name="Weifeng Xu" userId="e7aed605-a3dd-4d5a-a692-a87037af107b" providerId="ADAL" clId="{A607ACB5-F40C-412A-A21E-8D57A08453C8}" dt="2024-12-30T21:12:27.679" v="2815" actId="403"/>
-          <ac:spMkLst>
-            <pc:docMk/>
-            <pc:sldMk cId="4046926907" sldId="384"/>
-            <ac:spMk id="2" creationId="{864351F0-5951-44FE-BD84-21247EBCA017}"/>
-          </ac:spMkLst>
-        </pc:spChg>
-        <pc:spChg chg="add mod">
-          <ac:chgData name="Weifeng Xu" userId="e7aed605-a3dd-4d5a-a692-a87037af107b" providerId="ADAL" clId="{A607ACB5-F40C-412A-A21E-8D57A08453C8}" dt="2024-12-30T20:52:57.523" v="2694" actId="14100"/>
-          <ac:spMkLst>
-            <pc:docMk/>
-            <pc:sldMk cId="4046926907" sldId="384"/>
-            <ac:spMk id="3" creationId="{515EE217-3D94-9EEE-7DCF-08BF3E3BB400}"/>
-          </ac:spMkLst>
-        </pc:spChg>
-        <pc:spChg chg="mod">
-          <ac:chgData name="Weifeng Xu" userId="e7aed605-a3dd-4d5a-a692-a87037af107b" providerId="ADAL" clId="{A607ACB5-F40C-412A-A21E-8D57A08453C8}" dt="2024-12-30T21:15:44.919" v="2833" actId="20577"/>
-          <ac:spMkLst>
-            <pc:docMk/>
-            <pc:sldMk cId="4046926907" sldId="384"/>
-            <ac:spMk id="23" creationId="{B539B026-5FF6-4C35-A126-5D500B443F39}"/>
-          </ac:spMkLst>
-        </pc:spChg>
-        <pc:cxnChg chg="add mod">
-          <ac:chgData name="Weifeng Xu" userId="e7aed605-a3dd-4d5a-a692-a87037af107b" providerId="ADAL" clId="{A607ACB5-F40C-412A-A21E-8D57A08453C8}" dt="2024-12-30T20:58:00.298" v="2697" actId="14100"/>
-          <ac:cxnSpMkLst>
-            <pc:docMk/>
-            <pc:sldMk cId="4046926907" sldId="384"/>
-            <ac:cxnSpMk id="12" creationId="{56AC6D3C-4AB1-3BD3-8D17-21753ABCD993}"/>
-          </ac:cxnSpMkLst>
-        </pc:cxnChg>
-      </pc:sldChg>
-      <pc:sldChg chg="del">
-        <pc:chgData name="Weifeng Xu" userId="e7aed605-a3dd-4d5a-a692-a87037af107b" providerId="ADAL" clId="{A607ACB5-F40C-412A-A21E-8D57A08453C8}" dt="2021-07-27T23:25:53.927" v="1167" actId="47"/>
-        <pc:sldMkLst>
-          <pc:docMk/>
-          <pc:sldMk cId="954730872" sldId="385"/>
-        </pc:sldMkLst>
-      </pc:sldChg>
-      <pc:sldChg chg="modSp add del mod">
-        <pc:chgData name="Weifeng Xu" userId="e7aed605-a3dd-4d5a-a692-a87037af107b" providerId="ADAL" clId="{A607ACB5-F40C-412A-A21E-8D57A08453C8}" dt="2024-12-30T21:07:36.161" v="2712" actId="20577"/>
-        <pc:sldMkLst>
-          <pc:docMk/>
-          <pc:sldMk cId="3188243652" sldId="386"/>
-        </pc:sldMkLst>
-        <pc:spChg chg="mod">
-          <ac:chgData name="Weifeng Xu" userId="e7aed605-a3dd-4d5a-a692-a87037af107b" providerId="ADAL" clId="{A607ACB5-F40C-412A-A21E-8D57A08453C8}" dt="2024-12-30T21:07:36.161" v="2712" actId="20577"/>
+          <ac:chgData name="Weifeng Xu" userId="e7aed605-a3dd-4d5a-a692-a87037af107b" providerId="ADAL" clId="{A607ACB5-F40C-412A-A21E-8D57A08453C8}" dt="2025-04-01T02:42:13.408" v="3143" actId="20577"/>
           <ac:spMkLst>
             <pc:docMk/>
             <pc:sldMk cId="3188243652" sldId="386"/>
@@ -4399,7 +4383,7 @@
         </pc:sldMkLst>
       </pc:sldChg>
       <pc:sldChg chg="add del">
-        <pc:chgData name="Weifeng Xu" userId="e7aed605-a3dd-4d5a-a692-a87037af107b" providerId="ADAL" clId="{A607ACB5-F40C-412A-A21E-8D57A08453C8}" dt="2021-08-08T21:26:40.733" v="2608" actId="47"/>
+        <pc:chgData name="Weifeng Xu" userId="e7aed605-a3dd-4d5a-a692-a87037af107b" providerId="ADAL" clId="{A607ACB5-F40C-412A-A21E-8D57A08453C8}" dt="2025-04-01T02:49:24.223" v="3144" actId="47"/>
         <pc:sldMkLst>
           <pc:docMk/>
           <pc:sldMk cId="3552793750" sldId="413"/>
@@ -4446,59 +4430,59 @@
           <pc:docMk/>
           <pc:sldMk cId="587065400" sldId="429"/>
         </pc:sldMkLst>
-        <pc:spChg chg="mod">
-          <ac:chgData name="Weifeng Xu" userId="e7aed605-a3dd-4d5a-a692-a87037af107b" providerId="ADAL" clId="{A607ACB5-F40C-412A-A21E-8D57A08453C8}" dt="2024-12-30T21:13:52.827" v="2821" actId="6549"/>
+      </pc:sldChg>
+      <pc:sldChg chg="del">
+        <pc:chgData name="Weifeng Xu" userId="e7aed605-a3dd-4d5a-a692-a87037af107b" providerId="ADAL" clId="{A607ACB5-F40C-412A-A21E-8D57A08453C8}" dt="2021-08-08T21:26:32.428" v="2590" actId="47"/>
+        <pc:sldMkLst>
+          <pc:docMk/>
+          <pc:sldMk cId="1526221910" sldId="433"/>
+        </pc:sldMkLst>
+      </pc:sldChg>
+      <pc:sldChg chg="addSp delSp modSp del mod modClrScheme chgLayout">
+        <pc:chgData name="Weifeng Xu" userId="e7aed605-a3dd-4d5a-a692-a87037af107b" providerId="ADAL" clId="{A607ACB5-F40C-412A-A21E-8D57A08453C8}" dt="2024-12-30T21:02:45.151" v="2711" actId="47"/>
+        <pc:sldMkLst>
+          <pc:docMk/>
+          <pc:sldMk cId="3123541736" sldId="435"/>
+        </pc:sldMkLst>
+      </pc:sldChg>
+      <pc:sldChg chg="addSp delSp modSp add del mod">
+        <pc:chgData name="Weifeng Xu" userId="e7aed605-a3dd-4d5a-a692-a87037af107b" providerId="ADAL" clId="{A607ACB5-F40C-412A-A21E-8D57A08453C8}" dt="2025-04-01T02:40:10.263" v="3123" actId="114"/>
+        <pc:sldMkLst>
+          <pc:docMk/>
+          <pc:sldMk cId="2780548155" sldId="436"/>
+        </pc:sldMkLst>
+        <pc:spChg chg="add mod">
+          <ac:chgData name="Weifeng Xu" userId="e7aed605-a3dd-4d5a-a692-a87037af107b" providerId="ADAL" clId="{A607ACB5-F40C-412A-A21E-8D57A08453C8}" dt="2025-04-01T02:40:10.263" v="3123" actId="114"/>
           <ac:spMkLst>
             <pc:docMk/>
-            <pc:sldMk cId="587065400" sldId="429"/>
-            <ac:spMk id="2" creationId="{DFE64094-613C-48F2-8ECA-107E1BFCD186}"/>
+            <pc:sldMk cId="2780548155" sldId="436"/>
+            <ac:spMk id="5" creationId="{1B7912A6-7897-70F9-4193-C5AC949DEE4F}"/>
+          </ac:spMkLst>
+        </pc:spChg>
+        <pc:spChg chg="add mod">
+          <ac:chgData name="Weifeng Xu" userId="e7aed605-a3dd-4d5a-a692-a87037af107b" providerId="ADAL" clId="{A607ACB5-F40C-412A-A21E-8D57A08453C8}" dt="2025-04-01T01:53:09.403" v="2967" actId="14100"/>
+          <ac:spMkLst>
+            <pc:docMk/>
+            <pc:sldMk cId="2780548155" sldId="436"/>
+            <ac:spMk id="6" creationId="{318DC70F-E442-25FB-AF81-6F55AED1F6C6}"/>
           </ac:spMkLst>
         </pc:spChg>
         <pc:spChg chg="mod">
-          <ac:chgData name="Weifeng Xu" userId="e7aed605-a3dd-4d5a-a692-a87037af107b" providerId="ADAL" clId="{A607ACB5-F40C-412A-A21E-8D57A08453C8}" dt="2024-12-30T20:59:03.385" v="2710" actId="20577"/>
-          <ac:spMkLst>
-            <pc:docMk/>
-            <pc:sldMk cId="587065400" sldId="429"/>
-            <ac:spMk id="20" creationId="{5AB619D4-176D-4E1E-9E74-A7DB5C204CD2}"/>
-          </ac:spMkLst>
-        </pc:spChg>
-        <pc:cxnChg chg="mod">
-          <ac:chgData name="Weifeng Xu" userId="e7aed605-a3dd-4d5a-a692-a87037af107b" providerId="ADAL" clId="{A607ACB5-F40C-412A-A21E-8D57A08453C8}" dt="2024-12-30T20:58:52.571" v="2704" actId="14100"/>
-          <ac:cxnSpMkLst>
-            <pc:docMk/>
-            <pc:sldMk cId="587065400" sldId="429"/>
-            <ac:cxnSpMk id="22" creationId="{50208EA6-1BB4-4A79-9017-C48F942F8F7F}"/>
-          </ac:cxnSpMkLst>
-        </pc:cxnChg>
-      </pc:sldChg>
-      <pc:sldChg chg="del">
-        <pc:chgData name="Weifeng Xu" userId="e7aed605-a3dd-4d5a-a692-a87037af107b" providerId="ADAL" clId="{A607ACB5-F40C-412A-A21E-8D57A08453C8}" dt="2021-08-08T21:26:32.428" v="2590" actId="47"/>
-        <pc:sldMkLst>
-          <pc:docMk/>
-          <pc:sldMk cId="1526221910" sldId="433"/>
-        </pc:sldMkLst>
-      </pc:sldChg>
-      <pc:sldChg chg="addSp delSp modSp del mod modClrScheme chgLayout">
-        <pc:chgData name="Weifeng Xu" userId="e7aed605-a3dd-4d5a-a692-a87037af107b" providerId="ADAL" clId="{A607ACB5-F40C-412A-A21E-8D57A08453C8}" dt="2024-12-30T21:02:45.151" v="2711" actId="47"/>
-        <pc:sldMkLst>
-          <pc:docMk/>
-          <pc:sldMk cId="3123541736" sldId="435"/>
-        </pc:sldMkLst>
-      </pc:sldChg>
-      <pc:sldChg chg="addSp delSp modSp add del mod">
-        <pc:chgData name="Weifeng Xu" userId="e7aed605-a3dd-4d5a-a692-a87037af107b" providerId="ADAL" clId="{A607ACB5-F40C-412A-A21E-8D57A08453C8}" dt="2024-12-30T20:49:36.930" v="2691" actId="20577"/>
-        <pc:sldMkLst>
-          <pc:docMk/>
-          <pc:sldMk cId="2780548155" sldId="436"/>
-        </pc:sldMkLst>
-        <pc:spChg chg="mod">
-          <ac:chgData name="Weifeng Xu" userId="e7aed605-a3dd-4d5a-a692-a87037af107b" providerId="ADAL" clId="{A607ACB5-F40C-412A-A21E-8D57A08453C8}" dt="2024-12-30T20:49:36.930" v="2691" actId="20577"/>
+          <ac:chgData name="Weifeng Xu" userId="e7aed605-a3dd-4d5a-a692-a87037af107b" providerId="ADAL" clId="{A607ACB5-F40C-412A-A21E-8D57A08453C8}" dt="2025-04-01T01:51:53.215" v="2960" actId="207"/>
           <ac:spMkLst>
             <pc:docMk/>
             <pc:sldMk cId="2780548155" sldId="436"/>
             <ac:spMk id="9" creationId="{42411764-9368-4AC4-A59F-2FE58310C0C8}"/>
           </ac:spMkLst>
         </pc:spChg>
+        <pc:cxnChg chg="add mod">
+          <ac:chgData name="Weifeng Xu" userId="e7aed605-a3dd-4d5a-a692-a87037af107b" providerId="ADAL" clId="{A607ACB5-F40C-412A-A21E-8D57A08453C8}" dt="2025-04-01T01:53:15.505" v="2969" actId="14100"/>
+          <ac:cxnSpMkLst>
+            <pc:docMk/>
+            <pc:sldMk cId="2780548155" sldId="436"/>
+            <ac:cxnSpMk id="11" creationId="{304E0F14-4D48-2CB9-DBE8-D01A86C9B8E7}"/>
+          </ac:cxnSpMkLst>
+        </pc:cxnChg>
       </pc:sldChg>
       <pc:sldChg chg="del">
         <pc:chgData name="Weifeng Xu" userId="e7aed605-a3dd-4d5a-a692-a87037af107b" providerId="ADAL" clId="{A607ACB5-F40C-412A-A21E-8D57A08453C8}" dt="2021-08-08T21:26:31.137" v="2574" actId="47"/>
@@ -4597,6 +4581,37 @@
           <pc:docMk/>
           <pc:sldMk cId="3663679911" sldId="459"/>
         </pc:sldMkLst>
+      </pc:sldChg>
+      <pc:sldChg chg="addSp delSp modSp new mod ord modClrScheme chgLayout">
+        <pc:chgData name="Weifeng Xu" userId="e7aed605-a3dd-4d5a-a692-a87037af107b" providerId="ADAL" clId="{A607ACB5-F40C-412A-A21E-8D57A08453C8}" dt="2025-04-01T02:36:18.760" v="3121" actId="20577"/>
+        <pc:sldMkLst>
+          <pc:docMk/>
+          <pc:sldMk cId="2650941744" sldId="460"/>
+        </pc:sldMkLst>
+        <pc:spChg chg="mod">
+          <ac:chgData name="Weifeng Xu" userId="e7aed605-a3dd-4d5a-a692-a87037af107b" providerId="ADAL" clId="{A607ACB5-F40C-412A-A21E-8D57A08453C8}" dt="2025-04-01T02:33:33.453" v="3062" actId="26606"/>
+          <ac:spMkLst>
+            <pc:docMk/>
+            <pc:sldMk cId="2650941744" sldId="460"/>
+            <ac:spMk id="2" creationId="{C280624D-210E-39EB-3899-E035404E474D}"/>
+          </ac:spMkLst>
+        </pc:spChg>
+        <pc:spChg chg="add mod">
+          <ac:chgData name="Weifeng Xu" userId="e7aed605-a3dd-4d5a-a692-a87037af107b" providerId="ADAL" clId="{A607ACB5-F40C-412A-A21E-8D57A08453C8}" dt="2025-04-01T02:36:18.760" v="3121" actId="20577"/>
+          <ac:spMkLst>
+            <pc:docMk/>
+            <pc:sldMk cId="2650941744" sldId="460"/>
+            <ac:spMk id="6" creationId="{2CE52597-7161-536D-5F5B-276791F65A1B}"/>
+          </ac:spMkLst>
+        </pc:spChg>
+        <pc:picChg chg="add mod">
+          <ac:chgData name="Weifeng Xu" userId="e7aed605-a3dd-4d5a-a692-a87037af107b" providerId="ADAL" clId="{A607ACB5-F40C-412A-A21E-8D57A08453C8}" dt="2025-04-01T02:33:33.453" v="3062" actId="26606"/>
+          <ac:picMkLst>
+            <pc:docMk/>
+            <pc:sldMk cId="2650941744" sldId="460"/>
+            <ac:picMk id="4" creationId="{F01D739E-3A09-7009-DBB2-3E8D6BFD731B}"/>
+          </ac:picMkLst>
+        </pc:picChg>
       </pc:sldChg>
       <pc:sldChg chg="modSp new del mod">
         <pc:chgData name="Weifeng Xu" userId="e7aed605-a3dd-4d5a-a692-a87037af107b" providerId="ADAL" clId="{A607ACB5-F40C-412A-A21E-8D57A08453C8}" dt="2021-08-08T21:26:28.133" v="2546" actId="47"/>
@@ -6304,7 +6319,7 @@
           <a:p>
             <a:fld id="{EE41F6E3-57F9-402E-BDBA-5B2DE11C8530}" type="datetimeFigureOut">
               <a:rPr lang="en-US" smtClean="0"/>
-              <a:t>1/1/2025</a:t>
+              <a:t>4/2/2025</a:t>
             </a:fld>
             <a:endParaRPr lang="en-US"/>
           </a:p>
@@ -7542,7 +7557,7 @@
           <a:p>
             <a:fld id="{4263717A-E3C1-4BED-ABE0-B7069385E023}" type="datetimeFigureOut">
               <a:rPr lang="en-US" smtClean="0"/>
-              <a:t>1/1/2025</a:t>
+              <a:t>4/2/2025</a:t>
             </a:fld>
             <a:endParaRPr lang="en-US"/>
           </a:p>
@@ -7715,7 +7730,7 @@
           <a:p>
             <a:fld id="{4263717A-E3C1-4BED-ABE0-B7069385E023}" type="datetimeFigureOut">
               <a:rPr lang="en-US" smtClean="0"/>
-              <a:t>1/1/2025</a:t>
+              <a:t>4/2/2025</a:t>
             </a:fld>
             <a:endParaRPr lang="en-US"/>
           </a:p>
@@ -7893,7 +7908,7 @@
           <a:p>
             <a:fld id="{4263717A-E3C1-4BED-ABE0-B7069385E023}" type="datetimeFigureOut">
               <a:rPr lang="en-US" smtClean="0"/>
-              <a:t>1/1/2025</a:t>
+              <a:t>4/2/2025</a:t>
             </a:fld>
             <a:endParaRPr lang="en-US"/>
           </a:p>
@@ -8061,7 +8076,7 @@
           <a:p>
             <a:fld id="{4263717A-E3C1-4BED-ABE0-B7069385E023}" type="datetimeFigureOut">
               <a:rPr lang="en-US" smtClean="0"/>
-              <a:t>1/1/2025</a:t>
+              <a:t>4/2/2025</a:t>
             </a:fld>
             <a:endParaRPr lang="en-US"/>
           </a:p>
@@ -8306,7 +8321,7 @@
           <a:p>
             <a:fld id="{4263717A-E3C1-4BED-ABE0-B7069385E023}" type="datetimeFigureOut">
               <a:rPr lang="en-US" smtClean="0"/>
-              <a:t>1/1/2025</a:t>
+              <a:t>4/2/2025</a:t>
             </a:fld>
             <a:endParaRPr lang="en-US"/>
           </a:p>
@@ -8535,7 +8550,7 @@
           <a:p>
             <a:fld id="{4263717A-E3C1-4BED-ABE0-B7069385E023}" type="datetimeFigureOut">
               <a:rPr lang="en-US" smtClean="0"/>
-              <a:t>1/1/2025</a:t>
+              <a:t>4/2/2025</a:t>
             </a:fld>
             <a:endParaRPr lang="en-US"/>
           </a:p>
@@ -8899,7 +8914,7 @@
           <a:p>
             <a:fld id="{4263717A-E3C1-4BED-ABE0-B7069385E023}" type="datetimeFigureOut">
               <a:rPr lang="en-US" smtClean="0"/>
-              <a:t>1/1/2025</a:t>
+              <a:t>4/2/2025</a:t>
             </a:fld>
             <a:endParaRPr lang="en-US"/>
           </a:p>
@@ -9016,7 +9031,7 @@
           <a:p>
             <a:fld id="{4263717A-E3C1-4BED-ABE0-B7069385E023}" type="datetimeFigureOut">
               <a:rPr lang="en-US" smtClean="0"/>
-              <a:t>1/1/2025</a:t>
+              <a:t>4/2/2025</a:t>
             </a:fld>
             <a:endParaRPr lang="en-US"/>
           </a:p>
@@ -9111,7 +9126,7 @@
           <a:p>
             <a:fld id="{4263717A-E3C1-4BED-ABE0-B7069385E023}" type="datetimeFigureOut">
               <a:rPr lang="en-US" smtClean="0"/>
-              <a:t>1/1/2025</a:t>
+              <a:t>4/2/2025</a:t>
             </a:fld>
             <a:endParaRPr lang="en-US"/>
           </a:p>
@@ -9386,7 +9401,7 @@
           <a:p>
             <a:fld id="{4263717A-E3C1-4BED-ABE0-B7069385E023}" type="datetimeFigureOut">
               <a:rPr lang="en-US" smtClean="0"/>
-              <a:t>1/1/2025</a:t>
+              <a:t>4/2/2025</a:t>
             </a:fld>
             <a:endParaRPr lang="en-US"/>
           </a:p>
@@ -9638,7 +9653,7 @@
           <a:p>
             <a:fld id="{4263717A-E3C1-4BED-ABE0-B7069385E023}" type="datetimeFigureOut">
               <a:rPr lang="en-US" smtClean="0"/>
-              <a:t>1/1/2025</a:t>
+              <a:t>4/2/2025</a:t>
             </a:fld>
             <a:endParaRPr lang="en-US"/>
           </a:p>
@@ -9849,7 +9864,7 @@
           <a:p>
             <a:fld id="{4263717A-E3C1-4BED-ABE0-B7069385E023}" type="datetimeFigureOut">
               <a:rPr lang="en-US" smtClean="0"/>
-              <a:t>1/1/2025</a:t>
+              <a:t>4/2/2025</a:t>
             </a:fld>
             <a:endParaRPr lang="en-US"/>
           </a:p>
@@ -10441,7 +10456,11 @@
           <a:p>
             <a:r>
               <a:rPr lang="en-US"/>
-              <a:t>AOSP Apps/Packages Investigations</a:t>
+              <a:t>AOSP Apps </a:t>
+            </a:r>
+            <a:r>
+              <a:rPr lang="en-US" dirty="0"/>
+              <a:t>Investigations</a:t>
             </a:r>
           </a:p>
         </p:txBody>
@@ -11943,7 +11962,7 @@
         </p:blipFill>
         <p:spPr>
           <a:xfrm>
-            <a:off x="838200" y="2150283"/>
+            <a:off x="838200" y="1699712"/>
             <a:ext cx="11019592" cy="724794"/>
           </a:xfrm>
           <a:prstGeom prst="rect">
@@ -11965,7 +11984,7 @@
         </p:nvSpPr>
         <p:spPr>
           <a:xfrm>
-            <a:off x="838200" y="2915714"/>
+            <a:off x="838200" y="2465143"/>
             <a:ext cx="6124209" cy="4154984"/>
           </a:xfrm>
           <a:prstGeom prst="rect">
@@ -12080,10 +12099,24 @@
               <a:buChar char="•"/>
             </a:pPr>
             <a:r>
-              <a:rPr lang="en-GB" sz="2400" dirty="0">
-                <a:cs typeface="Calibri"/>
+              <a:rPr lang="en-GB" sz="2400" dirty="0"/>
+              <a:t>component (or "part") of an </a:t>
+            </a:r>
+            <a:r>
+              <a:rPr lang="en-GB" sz="2400" i="1" dirty="0">
+                <a:solidFill>
+                  <a:srgbClr val="7030A0"/>
+                </a:solidFill>
               </a:rPr>
-              <a:t>MMS-Multimedia Message Service</a:t>
+              <a:t>mms</a:t>
+            </a:r>
+            <a:r>
+              <a:rPr lang="en-GB" sz="2400" dirty="0"/>
+              <a:t>( </a:t>
+            </a:r>
+            <a:r>
+              <a:rPr lang="en-US" sz="2400" dirty="0"/>
+              <a:t>Multimedia Messaging Service</a:t>
             </a:r>
           </a:p>
           <a:p>
@@ -12091,18 +12124,22 @@
               <a:buFont typeface="Arial"/>
               <a:buChar char="•"/>
             </a:pPr>
-            <a:endParaRPr lang="en-GB" sz="2400" dirty="0">
-              <a:cs typeface="Calibri"/>
-            </a:endParaRPr>
-          </a:p>
-          <a:p>
-            <a:pPr marL="742950" lvl="1" indent="-285750">
-              <a:buFont typeface="Arial"/>
-              <a:buChar char="•"/>
-            </a:pPr>
-            <a:endParaRPr lang="en-US" sz="2400" dirty="0">
-              <a:cs typeface="Calibri"/>
-            </a:endParaRPr>
+            <a:r>
+              <a:rPr lang="en-GB" sz="2400" dirty="0"/>
+              <a:t>) message (</a:t>
+            </a:r>
+            <a:r>
+              <a:rPr lang="en-GB" sz="2400" i="1" dirty="0">
+                <a:solidFill>
+                  <a:srgbClr val="7030A0"/>
+                </a:solidFill>
+              </a:rPr>
+              <a:t>mms</a:t>
+            </a:r>
+            <a:r>
+              <a:rPr lang="en-GB" sz="2400" dirty="0"/>
+              <a:t> table seems missing)</a:t>
+            </a:r>
           </a:p>
         </p:txBody>
       </p:sp>
@@ -12128,7 +12165,7 @@
         </p:blipFill>
         <p:spPr>
           <a:xfrm>
-            <a:off x="8449846" y="2915714"/>
+            <a:off x="8449846" y="2465143"/>
             <a:ext cx="2833606" cy="3945014"/>
           </a:xfrm>
           <a:prstGeom prst="rect">
@@ -12150,7 +12187,7 @@
         </p:nvSpPr>
         <p:spPr>
           <a:xfrm>
-            <a:off x="9032282" y="4883862"/>
+            <a:off x="9032282" y="4433291"/>
             <a:ext cx="400373" cy="193729"/>
           </a:xfrm>
           <a:prstGeom prst="rect">
@@ -12202,7 +12239,7 @@
         </p:nvSpPr>
         <p:spPr>
           <a:xfrm>
-            <a:off x="9044187" y="5338923"/>
+            <a:off x="9044187" y="4888352"/>
             <a:ext cx="503695" cy="219559"/>
           </a:xfrm>
           <a:prstGeom prst="rect">
@@ -12254,7 +12291,7 @@
         </p:nvSpPr>
         <p:spPr>
           <a:xfrm>
-            <a:off x="1305267" y="2517939"/>
+            <a:off x="1305267" y="2067368"/>
             <a:ext cx="10577593" cy="348712"/>
           </a:xfrm>
           <a:prstGeom prst="rect">
@@ -12308,7 +12345,7 @@
         </p:nvCxnSpPr>
         <p:spPr>
           <a:xfrm>
-            <a:off x="2361537" y="3061252"/>
+            <a:off x="2361537" y="2610681"/>
             <a:ext cx="6520070" cy="1892411"/>
           </a:xfrm>
           <a:prstGeom prst="straightConnector1">
@@ -12349,7 +12386,7 @@
         </p:nvCxnSpPr>
         <p:spPr>
           <a:xfrm>
-            <a:off x="2697480" y="4572000"/>
+            <a:off x="2697480" y="4121429"/>
             <a:ext cx="6255689" cy="866692"/>
           </a:xfrm>
           <a:prstGeom prst="straightConnector1">
@@ -12376,43 +12413,6 @@
       </p:cxnSp>
       <p:sp>
         <p:nvSpPr>
-          <p:cNvPr id="22" name="TextBox 21">
-            <a:extLst>
-              <a:ext uri="{FF2B5EF4-FFF2-40B4-BE49-F238E27FC236}">
-                <a16:creationId xmlns:a16="http://schemas.microsoft.com/office/drawing/2014/main" id="{FDF33F04-7504-4DC7-9D96-72FABB086076}"/>
-              </a:ext>
-            </a:extLst>
-          </p:cNvPr>
-          <p:cNvSpPr txBox="1"/>
-          <p:nvPr/>
-        </p:nvSpPr>
-        <p:spPr>
-          <a:xfrm>
-            <a:off x="838200" y="1781789"/>
-            <a:ext cx="3085460" cy="369332"/>
-          </a:xfrm>
-          <a:prstGeom prst="rect">
-            <a:avLst/>
-          </a:prstGeom>
-          <a:solidFill>
-            <a:schemeClr val="accent4"/>
-          </a:solidFill>
-        </p:spPr>
-        <p:txBody>
-          <a:bodyPr wrap="none" rtlCol="0">
-            <a:spAutoFit/>
-          </a:bodyPr>
-          <a:lstStyle/>
-          <a:p>
-            <a:r>
-              <a:rPr lang="en-US"/>
-              <a:t>Show all tables in the database</a:t>
-            </a:r>
-          </a:p>
-        </p:txBody>
-      </p:sp>
-      <p:sp>
-        <p:nvSpPr>
           <p:cNvPr id="4" name="Rectangle 3">
             <a:extLst>
               <a:ext uri="{FF2B5EF4-FFF2-40B4-BE49-F238E27FC236}">
@@ -12425,7 +12425,7 @@
         </p:nvSpPr>
         <p:spPr>
           <a:xfrm>
-            <a:off x="9009422" y="4548582"/>
+            <a:off x="9009422" y="3607682"/>
             <a:ext cx="400373" cy="193729"/>
           </a:xfrm>
           <a:prstGeom prst="rect">
@@ -12479,8 +12479,8 @@
         </p:nvCxnSpPr>
         <p:spPr>
           <a:xfrm flipV="1">
-            <a:off x="2019300" y="4618383"/>
-            <a:ext cx="6839447" cy="1119903"/>
+            <a:off x="2019300" y="3743742"/>
+            <a:ext cx="6933869" cy="1543973"/>
           </a:xfrm>
           <a:prstGeom prst="straightConnector1">
             <a:avLst/>
@@ -15701,6 +15701,147 @@
           <p:cNvPr id="2" name="Title 1">
             <a:extLst>
               <a:ext uri="{FF2B5EF4-FFF2-40B4-BE49-F238E27FC236}">
+                <a16:creationId xmlns:a16="http://schemas.microsoft.com/office/drawing/2014/main" id="{C280624D-210E-39EB-3899-E035404E474D}"/>
+              </a:ext>
+            </a:extLst>
+          </p:cNvPr>
+          <p:cNvSpPr>
+            <a:spLocks noGrp="1"/>
+          </p:cNvSpPr>
+          <p:nvPr>
+            <p:ph type="title"/>
+          </p:nvPr>
+        </p:nvSpPr>
+        <p:spPr/>
+        <p:txBody>
+          <a:bodyPr/>
+          <a:lstStyle/>
+          <a:p>
+            <a:r>
+              <a:rPr lang="en-US" dirty="0"/>
+              <a:t>How MMS messages are saved?</a:t>
+            </a:r>
+          </a:p>
+        </p:txBody>
+      </p:sp>
+      <p:pic>
+        <p:nvPicPr>
+          <p:cNvPr id="4" name="Picture 3">
+            <a:extLst>
+              <a:ext uri="{FF2B5EF4-FFF2-40B4-BE49-F238E27FC236}">
+                <a16:creationId xmlns:a16="http://schemas.microsoft.com/office/drawing/2014/main" id="{F01D739E-3A09-7009-DBB2-3E8D6BFD731B}"/>
+              </a:ext>
+            </a:extLst>
+          </p:cNvPr>
+          <p:cNvPicPr>
+            <a:picLocks noChangeAspect="1"/>
+          </p:cNvPicPr>
+          <p:nvPr/>
+        </p:nvPicPr>
+        <p:blipFill>
+          <a:blip r:embed="rId2"/>
+          <a:stretch>
+            <a:fillRect/>
+          </a:stretch>
+        </p:blipFill>
+        <p:spPr>
+          <a:xfrm>
+            <a:off x="838200" y="1355883"/>
+            <a:ext cx="8260796" cy="5502117"/>
+          </a:xfrm>
+          <a:prstGeom prst="rect">
+            <a:avLst/>
+          </a:prstGeom>
+        </p:spPr>
+      </p:pic>
+      <p:sp>
+        <p:nvSpPr>
+          <p:cNvPr id="6" name="TextBox 5">
+            <a:extLst>
+              <a:ext uri="{FF2B5EF4-FFF2-40B4-BE49-F238E27FC236}">
+                <a16:creationId xmlns:a16="http://schemas.microsoft.com/office/drawing/2014/main" id="{2CE52597-7161-536D-5F5B-276791F65A1B}"/>
+              </a:ext>
+            </a:extLst>
+          </p:cNvPr>
+          <p:cNvSpPr txBox="1"/>
+          <p:nvPr/>
+        </p:nvSpPr>
+        <p:spPr>
+          <a:xfrm>
+            <a:off x="8020975" y="3429000"/>
+            <a:ext cx="2942947" cy="923330"/>
+          </a:xfrm>
+          <a:prstGeom prst="rect">
+            <a:avLst/>
+          </a:prstGeom>
+          <a:solidFill>
+            <a:schemeClr val="accent4">
+              <a:lumMod val="20000"/>
+              <a:lumOff val="80000"/>
+            </a:schemeClr>
+          </a:solidFill>
+        </p:spPr>
+        <p:txBody>
+          <a:bodyPr wrap="square">
+            <a:spAutoFit/>
+          </a:bodyPr>
+          <a:lstStyle/>
+          <a:p>
+            <a:r>
+              <a:rPr lang="en-GB" dirty="0"/>
+              <a:t>It seems </a:t>
+            </a:r>
+            <a:r>
+              <a:rPr lang="en-GB" sz="1800" i="1" dirty="0">
+                <a:solidFill>
+                  <a:srgbClr val="7030A0"/>
+                </a:solidFill>
+              </a:rPr>
+              <a:t>mms</a:t>
+            </a:r>
+            <a:r>
+              <a:rPr lang="en-GB" sz="1800" dirty="0"/>
+              <a:t> table is missing. Need further investigation.</a:t>
+            </a:r>
+            <a:endParaRPr lang="en-US" dirty="0"/>
+          </a:p>
+        </p:txBody>
+      </p:sp>
+    </p:spTree>
+    <p:extLst>
+      <p:ext uri="{BB962C8B-B14F-4D97-AF65-F5344CB8AC3E}">
+        <p14:creationId xmlns:p14="http://schemas.microsoft.com/office/powerpoint/2010/main" val="2650941744"/>
+      </p:ext>
+    </p:extLst>
+  </p:cSld>
+  <p:clrMapOvr>
+    <a:masterClrMapping/>
+  </p:clrMapOvr>
+</p:sld>
+</file>
+
+<file path=ppt/slides/slide23.xml><?xml version="1.0" encoding="utf-8"?>
+<p:sld xmlns:a="http://schemas.openxmlformats.org/drawingml/2006/main" xmlns:r="http://schemas.openxmlformats.org/officeDocument/2006/relationships" xmlns:p="http://schemas.openxmlformats.org/presentationml/2006/main">
+  <p:cSld>
+    <p:spTree>
+      <p:nvGrpSpPr>
+        <p:cNvPr id="1" name=""/>
+        <p:cNvGrpSpPr/>
+        <p:nvPr/>
+      </p:nvGrpSpPr>
+      <p:grpSpPr>
+        <a:xfrm>
+          <a:off x="0" y="0"/>
+          <a:ext cx="0" cy="0"/>
+          <a:chOff x="0" y="0"/>
+          <a:chExt cx="0" cy="0"/>
+        </a:xfrm>
+      </p:grpSpPr>
+      <p:sp>
+        <p:nvSpPr>
+          <p:cNvPr id="2" name="Title 1">
+            <a:extLst>
+              <a:ext uri="{FF2B5EF4-FFF2-40B4-BE49-F238E27FC236}">
                 <a16:creationId xmlns:a16="http://schemas.microsoft.com/office/drawing/2014/main" id="{88863ECD-00BE-4819-A018-205CF4AEB8C4}"/>
               </a:ext>
             </a:extLst>
@@ -15829,7 +15970,7 @@
         <p:spPr>
           <a:xfrm>
             <a:off x="976027" y="3807618"/>
-            <a:ext cx="9996768" cy="1938992"/>
+            <a:ext cx="9996768" cy="2246769"/>
           </a:xfrm>
           <a:prstGeom prst="rect">
             <a:avLst/>
@@ -15845,27 +15986,55 @@
           </a:bodyPr>
           <a:lstStyle/>
           <a:p>
-            <a:r>
-              <a:rPr lang="en-US" sz="2400" dirty="0">
+            <a:pPr marL="342900" indent="-342900">
+              <a:buFont typeface="Arial" panose="020B0604020202020204" pitchFamily="34" charset="0"/>
+              <a:buChar char="•"/>
+            </a:pPr>
+            <a:r>
+              <a:rPr lang="en-GB" sz="2000" dirty="0">
+                <a:solidFill>
+                  <a:srgbClr val="FF0000"/>
+                </a:solidFill>
+                <a:cs typeface="Calibri"/>
+              </a:rPr>
+              <a:t>Purpose</a:t>
+            </a:r>
+            <a:r>
+              <a:rPr lang="en-GB" sz="2000" dirty="0">
+                <a:cs typeface="Calibri"/>
+              </a:rPr>
+              <a:t>: If an MMS contains a text message, an image, and a video, the part table will have three rows—one for each component—linked to that MMS message.</a:t>
+            </a:r>
+            <a:endParaRPr lang="en-US" sz="2000" dirty="0">
+              <a:cs typeface="Calibri"/>
+            </a:endParaRPr>
+          </a:p>
+          <a:p>
+            <a:pPr marL="342900" indent="-342900">
+              <a:buFont typeface="Arial" panose="020B0604020202020204" pitchFamily="34" charset="0"/>
+              <a:buChar char="•"/>
+            </a:pPr>
+            <a:r>
+              <a:rPr lang="en-US" sz="2000" dirty="0">
                 <a:cs typeface="Calibri"/>
               </a:rPr>
               <a:t>Part table stores the following:</a:t>
             </a:r>
           </a:p>
           <a:p>
-            <a:pPr marL="285750" indent="-285750">
+            <a:pPr marL="742950" lvl="1" indent="-285750">
               <a:buFont typeface="Arial"/>
               <a:buChar char="•"/>
             </a:pPr>
             <a:r>
-              <a:rPr lang="en-US" sz="2400" b="1" dirty="0">
+              <a:rPr lang="en-US" sz="2000" b="1" dirty="0">
                 <a:ea typeface="+mn-lt"/>
                 <a:cs typeface="+mn-lt"/>
               </a:rPr>
               <a:t>_id: </a:t>
             </a:r>
             <a:r>
-              <a:rPr lang="en-US" sz="2400" dirty="0">
+              <a:rPr lang="en-US" sz="2000" dirty="0">
                 <a:ea typeface="+mn-lt"/>
                 <a:cs typeface="+mn-lt"/>
               </a:rPr>
@@ -15873,26 +16042,26 @@
             </a:r>
           </a:p>
           <a:p>
-            <a:pPr marL="285750" indent="-285750">
+            <a:pPr marL="742950" lvl="1" indent="-285750">
               <a:buFont typeface="Arial"/>
               <a:buChar char="•"/>
             </a:pPr>
             <a:r>
-              <a:rPr lang="en-US" sz="2400" b="1" dirty="0" err="1">
+              <a:rPr lang="en-US" sz="2000" b="1" dirty="0" err="1">
                 <a:ea typeface="+mn-lt"/>
                 <a:cs typeface="+mn-lt"/>
               </a:rPr>
               <a:t>ct</a:t>
             </a:r>
             <a:r>
-              <a:rPr lang="en-US" sz="2400" b="1" dirty="0">
+              <a:rPr lang="en-US" sz="2000" b="1" dirty="0">
                 <a:ea typeface="+mn-lt"/>
                 <a:cs typeface="+mn-lt"/>
               </a:rPr>
               <a:t>: </a:t>
             </a:r>
             <a:r>
-              <a:rPr lang="en-US" sz="2400" dirty="0">
+              <a:rPr lang="en-US" sz="2000" dirty="0">
                 <a:ea typeface="+mn-lt"/>
                 <a:cs typeface="+mn-lt"/>
               </a:rPr>
@@ -15900,25 +16069,25 @@
             </a:r>
           </a:p>
           <a:p>
-            <a:pPr marL="285750" indent="-285750">
+            <a:pPr marL="742950" lvl="1" indent="-285750">
               <a:buFont typeface="Arial"/>
               <a:buChar char="•"/>
             </a:pPr>
             <a:r>
-              <a:rPr lang="en-US" sz="2400" b="1" dirty="0">
+              <a:rPr lang="en-US" sz="2000" b="1" dirty="0">
                 <a:ea typeface="+mn-lt"/>
                 <a:cs typeface="+mn-lt"/>
               </a:rPr>
               <a:t>text:</a:t>
             </a:r>
             <a:r>
-              <a:rPr lang="en-US" sz="2400" dirty="0">
+              <a:rPr lang="en-US" sz="2000" dirty="0">
                 <a:ea typeface="+mn-lt"/>
                 <a:cs typeface="+mn-lt"/>
               </a:rPr>
               <a:t> Represents the body of the MMS.</a:t>
             </a:r>
-            <a:endParaRPr lang="en-US" sz="2400" dirty="0">
+            <a:endParaRPr lang="en-US" sz="2000" dirty="0">
               <a:cs typeface="Calibri"/>
             </a:endParaRPr>
           </a:p>
@@ -15976,48 +16145,6 @@
           </a:p>
         </p:txBody>
       </p:sp>
-      <p:cxnSp>
-        <p:nvCxnSpPr>
-          <p:cNvPr id="10" name="Straight Arrow Connector 9">
-            <a:extLst>
-              <a:ext uri="{FF2B5EF4-FFF2-40B4-BE49-F238E27FC236}">
-                <a16:creationId xmlns:a16="http://schemas.microsoft.com/office/drawing/2014/main" id="{0A7C9E7B-7104-4EC5-99A6-6D0966D7E0B9}"/>
-              </a:ext>
-            </a:extLst>
-          </p:cNvPr>
-          <p:cNvCxnSpPr>
-            <a:cxnSpLocks/>
-            <a:endCxn id="8" idx="3"/>
-          </p:cNvCxnSpPr>
-          <p:nvPr/>
-        </p:nvCxnSpPr>
-        <p:spPr>
-          <a:xfrm flipH="1">
-            <a:off x="2050403" y="1102659"/>
-            <a:ext cx="881056" cy="884093"/>
-          </a:xfrm>
-          <a:prstGeom prst="straightConnector1">
-            <a:avLst/>
-          </a:prstGeom>
-          <a:ln>
-            <a:tailEnd type="triangle"/>
-          </a:ln>
-        </p:spPr>
-        <p:style>
-          <a:lnRef idx="1">
-            <a:schemeClr val="accent2"/>
-          </a:lnRef>
-          <a:fillRef idx="0">
-            <a:schemeClr val="accent2"/>
-          </a:fillRef>
-          <a:effectRef idx="0">
-            <a:schemeClr val="accent2"/>
-          </a:effectRef>
-          <a:fontRef idx="minor">
-            <a:schemeClr val="tx1"/>
-          </a:fontRef>
-        </p:style>
-      </p:cxnSp>
       <p:sp>
         <p:nvSpPr>
           <p:cNvPr id="14" name="Rectangle 13">
@@ -16070,6 +16197,151 @@
           </a:p>
         </p:txBody>
       </p:sp>
+      <p:sp>
+        <p:nvSpPr>
+          <p:cNvPr id="5" name="TextBox 4">
+            <a:extLst>
+              <a:ext uri="{FF2B5EF4-FFF2-40B4-BE49-F238E27FC236}">
+                <a16:creationId xmlns:a16="http://schemas.microsoft.com/office/drawing/2014/main" id="{1B7912A6-7897-70F9-4193-C5AC949DEE4F}"/>
+              </a:ext>
+            </a:extLst>
+          </p:cNvPr>
+          <p:cNvSpPr txBox="1"/>
+          <p:nvPr/>
+        </p:nvSpPr>
+        <p:spPr>
+          <a:xfrm>
+            <a:off x="3069431" y="1175373"/>
+            <a:ext cx="3952806" cy="369332"/>
+          </a:xfrm>
+          <a:prstGeom prst="rect">
+            <a:avLst/>
+          </a:prstGeom>
+          <a:solidFill>
+            <a:schemeClr val="accent4">
+              <a:lumMod val="20000"/>
+              <a:lumOff val="80000"/>
+            </a:schemeClr>
+          </a:solidFill>
+        </p:spPr>
+        <p:txBody>
+          <a:bodyPr wrap="square">
+            <a:spAutoFit/>
+          </a:bodyPr>
+          <a:lstStyle/>
+          <a:p>
+            <a:r>
+              <a:rPr lang="en-GB" dirty="0"/>
+              <a:t>links to the _id column in the </a:t>
+            </a:r>
+            <a:r>
+              <a:rPr lang="en-GB" i="1" dirty="0">
+                <a:solidFill>
+                  <a:srgbClr val="7030A0"/>
+                </a:solidFill>
+              </a:rPr>
+              <a:t>mms</a:t>
+            </a:r>
+            <a:r>
+              <a:rPr lang="en-GB" dirty="0"/>
+              <a:t> table</a:t>
+            </a:r>
+          </a:p>
+        </p:txBody>
+      </p:sp>
+      <p:sp>
+        <p:nvSpPr>
+          <p:cNvPr id="6" name="Rectangle 5">
+            <a:extLst>
+              <a:ext uri="{FF2B5EF4-FFF2-40B4-BE49-F238E27FC236}">
+                <a16:creationId xmlns:a16="http://schemas.microsoft.com/office/drawing/2014/main" id="{318DC70F-E442-25FB-AF81-6F55AED1F6C6}"/>
+              </a:ext>
+            </a:extLst>
+          </p:cNvPr>
+          <p:cNvSpPr/>
+          <p:nvPr/>
+        </p:nvSpPr>
+        <p:spPr>
+          <a:xfrm>
+            <a:off x="1708150" y="2161005"/>
+            <a:ext cx="518216" cy="219560"/>
+          </a:xfrm>
+          <a:prstGeom prst="rect">
+            <a:avLst/>
+          </a:prstGeom>
+          <a:noFill/>
+          <a:ln w="28575">
+            <a:solidFill>
+              <a:srgbClr val="FF0000"/>
+            </a:solidFill>
+          </a:ln>
+        </p:spPr>
+        <p:style>
+          <a:lnRef idx="2">
+            <a:schemeClr val="accent1">
+              <a:shade val="50000"/>
+            </a:schemeClr>
+          </a:lnRef>
+          <a:fillRef idx="1">
+            <a:schemeClr val="accent1"/>
+          </a:fillRef>
+          <a:effectRef idx="0">
+            <a:schemeClr val="accent1"/>
+          </a:effectRef>
+          <a:fontRef idx="minor">
+            <a:schemeClr val="lt1"/>
+          </a:fontRef>
+        </p:style>
+        <p:txBody>
+          <a:bodyPr rtlCol="0" anchor="ctr"/>
+          <a:lstStyle/>
+          <a:p>
+            <a:pPr algn="ctr"/>
+            <a:endParaRPr lang="en-US"/>
+          </a:p>
+        </p:txBody>
+      </p:sp>
+      <p:cxnSp>
+        <p:nvCxnSpPr>
+          <p:cNvPr id="11" name="Straight Arrow Connector 10">
+            <a:extLst>
+              <a:ext uri="{FF2B5EF4-FFF2-40B4-BE49-F238E27FC236}">
+                <a16:creationId xmlns:a16="http://schemas.microsoft.com/office/drawing/2014/main" id="{304E0F14-4D48-2CB9-DBE8-D01A86C9B8E7}"/>
+              </a:ext>
+            </a:extLst>
+          </p:cNvPr>
+          <p:cNvCxnSpPr>
+            <a:cxnSpLocks/>
+          </p:cNvCxnSpPr>
+          <p:nvPr/>
+        </p:nvCxnSpPr>
+        <p:spPr>
+          <a:xfrm flipH="1">
+            <a:off x="2202803" y="1474619"/>
+            <a:ext cx="728656" cy="664533"/>
+          </a:xfrm>
+          <a:prstGeom prst="straightConnector1">
+            <a:avLst/>
+          </a:prstGeom>
+          <a:ln>
+            <a:tailEnd type="triangle"/>
+          </a:ln>
+        </p:spPr>
+        <p:style>
+          <a:lnRef idx="1">
+            <a:schemeClr val="accent2"/>
+          </a:lnRef>
+          <a:fillRef idx="0">
+            <a:schemeClr val="accent2"/>
+          </a:fillRef>
+          <a:effectRef idx="0">
+            <a:schemeClr val="accent2"/>
+          </a:effectRef>
+          <a:fontRef idx="minor">
+            <a:schemeClr val="tx1"/>
+          </a:fontRef>
+        </p:style>
+      </p:cxnSp>
     </p:spTree>
     <p:extLst>
       <p:ext uri="{BB962C8B-B14F-4D97-AF65-F5344CB8AC3E}">
@@ -16083,7 +16355,7 @@
 </p:sld>
 </file>
 
-<file path=ppt/slides/slide23.xml><?xml version="1.0" encoding="utf-8"?>
+<file path=ppt/slides/slide24.xml><?xml version="1.0" encoding="utf-8"?>
 <p:sld xmlns:a="http://schemas.openxmlformats.org/drawingml/2006/main" xmlns:r="http://schemas.openxmlformats.org/officeDocument/2006/relationships" xmlns:p="http://schemas.openxmlformats.org/presentationml/2006/main">
   <p:cSld>
     <p:spTree>
@@ -16312,7 +16584,7 @@
 </p:sld>
 </file>
 
-<file path=ppt/slides/slide24.xml><?xml version="1.0" encoding="utf-8"?>
+<file path=ppt/slides/slide25.xml><?xml version="1.0" encoding="utf-8"?>
 <p:sld xmlns:a="http://schemas.openxmlformats.org/drawingml/2006/main" xmlns:r="http://schemas.openxmlformats.org/officeDocument/2006/relationships" xmlns:p="http://schemas.openxmlformats.org/presentationml/2006/main">
   <p:cSld>
     <p:spTree>
@@ -16472,8 +16744,19 @@
                 <a:ea typeface="+mn-lt"/>
                 <a:cs typeface="+mn-lt"/>
               </a:rPr>
-              <a:t>, threads, part</a:t>
-            </a:r>
+              <a:t>, threads, part (if mms </a:t>
+            </a:r>
+            <a:r>
+              <a:rPr lang="en-US">
+                <a:ea typeface="+mn-lt"/>
+                <a:cs typeface="+mn-lt"/>
+              </a:rPr>
+              <a:t>is found)</a:t>
+            </a:r>
+            <a:endParaRPr lang="en-US" dirty="0">
+              <a:ea typeface="+mn-lt"/>
+              <a:cs typeface="+mn-lt"/>
+            </a:endParaRPr>
           </a:p>
           <a:p>
             <a:pPr marL="800100" lvl="1" indent="-342900"/>
@@ -16496,177 +16779,6 @@
     <p:extLst>
       <p:ext uri="{BB962C8B-B14F-4D97-AF65-F5344CB8AC3E}">
         <p14:creationId xmlns:p14="http://schemas.microsoft.com/office/powerpoint/2010/main" val="3188243652"/>
-      </p:ext>
-    </p:extLst>
-  </p:cSld>
-  <p:clrMapOvr>
-    <a:masterClrMapping/>
-  </p:clrMapOvr>
-</p:sld>
-</file>
-
-<file path=ppt/slides/slide25.xml><?xml version="1.0" encoding="utf-8"?>
-<p:sld xmlns:a="http://schemas.openxmlformats.org/drawingml/2006/main" xmlns:r="http://schemas.openxmlformats.org/officeDocument/2006/relationships" xmlns:p="http://schemas.openxmlformats.org/presentationml/2006/main">
-  <p:cSld>
-    <p:spTree>
-      <p:nvGrpSpPr>
-        <p:cNvPr id="1" name=""/>
-        <p:cNvGrpSpPr/>
-        <p:nvPr/>
-      </p:nvGrpSpPr>
-      <p:grpSpPr>
-        <a:xfrm>
-          <a:off x="0" y="0"/>
-          <a:ext cx="0" cy="0"/>
-          <a:chOff x="0" y="0"/>
-          <a:chExt cx="0" cy="0"/>
-        </a:xfrm>
-      </p:grpSpPr>
-      <p:sp>
-        <p:nvSpPr>
-          <p:cNvPr id="2" name="Title 1">
-            <a:extLst>
-              <a:ext uri="{FF2B5EF4-FFF2-40B4-BE49-F238E27FC236}">
-                <a16:creationId xmlns:a16="http://schemas.microsoft.com/office/drawing/2014/main" id="{2BC2D130-9011-4F06-B0D9-B7A227B27E8C}"/>
-              </a:ext>
-            </a:extLst>
-          </p:cNvPr>
-          <p:cNvSpPr>
-            <a:spLocks noGrp="1"/>
-          </p:cNvSpPr>
-          <p:nvPr>
-            <p:ph type="title"/>
-          </p:nvPr>
-        </p:nvSpPr>
-        <p:spPr/>
-        <p:txBody>
-          <a:bodyPr/>
-          <a:lstStyle/>
-          <a:p>
-            <a:r>
-              <a:rPr lang="en-US">
-                <a:cs typeface="Calibri Light"/>
-              </a:rPr>
-              <a:t>To summarize</a:t>
-            </a:r>
-            <a:endParaRPr lang="en-US"/>
-          </a:p>
-        </p:txBody>
-      </p:sp>
-      <p:sp>
-        <p:nvSpPr>
-          <p:cNvPr id="3" name="Content Placeholder 2">
-            <a:extLst>
-              <a:ext uri="{FF2B5EF4-FFF2-40B4-BE49-F238E27FC236}">
-                <a16:creationId xmlns:a16="http://schemas.microsoft.com/office/drawing/2014/main" id="{604533E3-51A2-4828-9C67-5DC0A216C68A}"/>
-              </a:ext>
-            </a:extLst>
-          </p:cNvPr>
-          <p:cNvSpPr>
-            <a:spLocks noGrp="1"/>
-          </p:cNvSpPr>
-          <p:nvPr>
-            <p:ph idx="1"/>
-          </p:nvPr>
-        </p:nvSpPr>
-        <p:spPr/>
-        <p:txBody>
-          <a:bodyPr vert="horz" lIns="91440" tIns="45720" rIns="91440" bIns="45720" rtlCol="0" anchor="t">
-            <a:normAutofit/>
-          </a:bodyPr>
-          <a:lstStyle/>
-          <a:p>
-            <a:r>
-              <a:rPr lang="en-US">
-                <a:cs typeface="Calibri"/>
-              </a:rPr>
-              <a:t>Understand the application</a:t>
-            </a:r>
-            <a:endParaRPr lang="en-US">
-              <a:ea typeface="+mn-lt"/>
-              <a:cs typeface="+mn-lt"/>
-            </a:endParaRPr>
-          </a:p>
-          <a:p>
-            <a:r>
-              <a:rPr lang="en-US">
-                <a:cs typeface="Calibri"/>
-              </a:rPr>
-              <a:t>Locate the calendar package</a:t>
-            </a:r>
-            <a:endParaRPr lang="en-US">
-              <a:ea typeface="+mn-lt"/>
-              <a:cs typeface="+mn-lt"/>
-            </a:endParaRPr>
-          </a:p>
-          <a:p>
-            <a:r>
-              <a:rPr lang="en-US">
-                <a:cs typeface="Calibri"/>
-              </a:rPr>
-              <a:t>Look at the application directories</a:t>
-            </a:r>
-            <a:endParaRPr lang="en-US">
-              <a:ea typeface="+mn-lt"/>
-              <a:cs typeface="+mn-lt"/>
-            </a:endParaRPr>
-          </a:p>
-          <a:p>
-            <a:r>
-              <a:rPr lang="en-US">
-                <a:ea typeface="+mn-lt"/>
-                <a:cs typeface="+mn-lt"/>
-              </a:rPr>
-              <a:t>Go to the "databases" directory</a:t>
-            </a:r>
-          </a:p>
-          <a:p>
-            <a:pPr marL="800100" lvl="1" indent="-342900">
-              <a:buFont typeface="Arial"/>
-              <a:buChar char="•"/>
-            </a:pPr>
-            <a:r>
-              <a:rPr lang="en-US">
-                <a:ea typeface="+mn-lt"/>
-                <a:cs typeface="+mn-lt"/>
-              </a:rPr>
-              <a:t>Open </a:t>
-            </a:r>
-            <a:r>
-              <a:rPr lang="en-US" err="1">
-                <a:ea typeface="+mn-lt"/>
-                <a:cs typeface="+mn-lt"/>
-              </a:rPr>
-              <a:t>calendar.db</a:t>
-            </a:r>
-          </a:p>
-          <a:p>
-            <a:pPr marL="800100" lvl="1" indent="-342900">
-              <a:buFont typeface="Arial"/>
-              <a:buChar char="•"/>
-            </a:pPr>
-            <a:r>
-              <a:rPr lang="en-US">
-                <a:ea typeface="+mn-lt"/>
-                <a:cs typeface="+mn-lt"/>
-              </a:rPr>
-              <a:t>Explore these tables: events, reminders</a:t>
-            </a:r>
-          </a:p>
-          <a:p>
-            <a:pPr marL="0" indent="0">
-              <a:buNone/>
-            </a:pPr>
-            <a:endParaRPr lang="en-US">
-              <a:cs typeface="Calibri"/>
-            </a:endParaRPr>
-          </a:p>
-        </p:txBody>
-      </p:sp>
-    </p:spTree>
-    <p:extLst>
-      <p:ext uri="{BB962C8B-B14F-4D97-AF65-F5344CB8AC3E}">
-        <p14:creationId xmlns:p14="http://schemas.microsoft.com/office/powerpoint/2010/main" val="3552793750"/>
       </p:ext>
     </p:extLst>
   </p:cSld>
@@ -18091,7 +18203,7 @@
           <a:lstStyle/>
           <a:p>
             <a:r>
-              <a:rPr lang="en-US"/>
+              <a:rPr lang="en-US" dirty="0"/>
               <a:t>Investigating Messaging Services</a:t>
             </a:r>
           </a:p>

</xml_diff>